<commit_message>
induction slides (4 parts) pptx
</commit_message>
<xml_diff>
--- a/spring12/slidesS12/bogus-induction.pptx
+++ b/spring12/slidesS12/bogus-induction.pptx
@@ -208,7 +208,7 @@
             <a:fld id="{D875CB5D-1501-4E8C-8449-8F562B53033D}" type="datetimeFigureOut">
               <a:rPr lang="en-US" smtClean="0"/>
               <a:pPr/>
-              <a:t>2/21/12</a:t>
+              <a:t>2/23/12</a:t>
             </a:fld>
             <a:endParaRPr lang="en-US"/>
           </a:p>
@@ -375,7 +375,7 @@
             <a:fld id="{2E64E5CB-D4EF-403A-9BB6-139C52688DF7}" type="datetimeFigureOut">
               <a:rPr lang="en-US" smtClean="0"/>
               <a:pPr/>
-              <a:t>2/21/12</a:t>
+              <a:t>2/23/12</a:t>
             </a:fld>
             <a:endParaRPr lang="en-US"/>
           </a:p>
@@ -5855,7 +5855,7 @@
 </file>
 
 <file path=ppt/slides/slide5.xml><?xml version="1.0" encoding="utf-8"?>
-<p:sld xmlns:a="http://schemas.openxmlformats.org/drawingml/2006/main" xmlns:r="http://schemas.openxmlformats.org/officeDocument/2006/relationships" xmlns:p="http://schemas.openxmlformats.org/presentationml/2006/main">
+<p:sld xmlns:a="http://schemas.openxmlformats.org/drawingml/2006/main" xmlns:r="http://schemas.openxmlformats.org/officeDocument/2006/relationships" xmlns:p="http://schemas.openxmlformats.org/presentationml/2006/main" show="0">
   <p:cSld>
     <p:spTree>
       <p:nvGrpSpPr>
@@ -6678,6 +6678,14 @@
   <p:clrMapOvr>
     <a:masterClrMapping/>
   </p:clrMapOvr>
+  <mc:AlternateContent xmlns:mc="http://schemas.openxmlformats.org/markup-compatibility/2006">
+    <mc:Choice xmlns:p14="http://schemas.microsoft.com/office/powerpoint/2010/main" Requires="p14">
+      <p:transition spd="slow" p14:dur="2000"/>
+    </mc:Choice>
+    <mc:Fallback>
+      <p:transition xmlns:p14="http://schemas.microsoft.com/office/powerpoint/2010/main" spd="slow"/>
+    </mc:Fallback>
+  </mc:AlternateContent>
   <p:timing>
     <p:tnLst>
       <p:par>
@@ -7753,6 +7761,9 @@
                     <p:cTn id="3" fill="hold">
                       <p:stCondLst>
                         <p:cond delay="indefinite"/>
+                        <p:cond evt="onBegin" delay="0">
+                          <p:tn val="2"/>
+                        </p:cond>
                       </p:stCondLst>
                       <p:childTnLst>
                         <p:par>
@@ -7762,7 +7773,7 @@
                             </p:stCondLst>
                             <p:childTnLst>
                               <p:par>
-                                <p:cTn id="5" presetID="2" presetClass="entr" presetSubtype="1" fill="hold" nodeType="clickEffect">
+                                <p:cTn id="5" presetID="2" presetClass="entr" presetSubtype="8" fill="hold" nodeType="withEffect">
                                   <p:stCondLst>
                                     <p:cond delay="0"/>
                                   </p:stCondLst>
@@ -7770,88 +7781,6 @@
                                     <p:set>
                                       <p:cBhvr>
                                         <p:cTn id="6" dur="1" fill="hold">
-                                          <p:stCondLst>
-                                            <p:cond delay="0"/>
-                                          </p:stCondLst>
-                                        </p:cTn>
-                                        <p:tgtEl>
-                                          <p:spTgt spid="4"/>
-                                        </p:tgtEl>
-                                        <p:attrNameLst>
-                                          <p:attrName>style.visibility</p:attrName>
-                                        </p:attrNameLst>
-                                      </p:cBhvr>
-                                      <p:to>
-                                        <p:strVal val="visible"/>
-                                      </p:to>
-                                    </p:set>
-                                    <p:anim calcmode="lin" valueType="num">
-                                      <p:cBhvr additive="base">
-                                        <p:cTn id="7" dur="500" fill="hold"/>
-                                        <p:tgtEl>
-                                          <p:spTgt spid="4"/>
-                                        </p:tgtEl>
-                                        <p:attrNameLst>
-                                          <p:attrName>ppt_x</p:attrName>
-                                        </p:attrNameLst>
-                                      </p:cBhvr>
-                                      <p:tavLst>
-                                        <p:tav tm="0">
-                                          <p:val>
-                                            <p:strVal val="#ppt_x"/>
-                                          </p:val>
-                                        </p:tav>
-                                        <p:tav tm="100000">
-                                          <p:val>
-                                            <p:strVal val="#ppt_x"/>
-                                          </p:val>
-                                        </p:tav>
-                                      </p:tavLst>
-                                    </p:anim>
-                                    <p:anim calcmode="lin" valueType="num">
-                                      <p:cBhvr additive="base">
-                                        <p:cTn id="8" dur="500" fill="hold"/>
-                                        <p:tgtEl>
-                                          <p:spTgt spid="4"/>
-                                        </p:tgtEl>
-                                        <p:attrNameLst>
-                                          <p:attrName>ppt_y</p:attrName>
-                                        </p:attrNameLst>
-                                      </p:cBhvr>
-                                      <p:tavLst>
-                                        <p:tav tm="0">
-                                          <p:val>
-                                            <p:strVal val="0-#ppt_h/2"/>
-                                          </p:val>
-                                        </p:tav>
-                                        <p:tav tm="100000">
-                                          <p:val>
-                                            <p:strVal val="#ppt_y"/>
-                                          </p:val>
-                                        </p:tav>
-                                      </p:tavLst>
-                                    </p:anim>
-                                  </p:childTnLst>
-                                </p:cTn>
-                              </p:par>
-                            </p:childTnLst>
-                          </p:cTn>
-                        </p:par>
-                        <p:par>
-                          <p:cTn id="9" fill="hold">
-                            <p:stCondLst>
-                              <p:cond delay="500"/>
-                            </p:stCondLst>
-                            <p:childTnLst>
-                              <p:par>
-                                <p:cTn id="10" presetID="2" presetClass="entr" presetSubtype="3" fill="hold" nodeType="afterEffect">
-                                  <p:stCondLst>
-                                    <p:cond delay="0"/>
-                                  </p:stCondLst>
-                                  <p:childTnLst>
-                                    <p:set>
-                                      <p:cBhvr>
-                                        <p:cTn id="11" dur="1" fill="hold">
                                           <p:stCondLst>
                                             <p:cond delay="0"/>
                                           </p:stCondLst>
@@ -7869,7 +7798,7 @@
                                     </p:set>
                                     <p:anim calcmode="lin" valueType="num">
                                       <p:cBhvr additive="base">
-                                        <p:cTn id="12" dur="1000" fill="hold"/>
+                                        <p:cTn id="7" dur="1000" fill="hold"/>
                                         <p:tgtEl>
                                           <p:spTgt spid="3"/>
                                         </p:tgtEl>
@@ -7880,7 +7809,7 @@
                                       <p:tavLst>
                                         <p:tav tm="0">
                                           <p:val>
-                                            <p:strVal val="1+#ppt_w/2"/>
+                                            <p:strVal val="0-#ppt_w/2"/>
                                           </p:val>
                                         </p:tav>
                                         <p:tav tm="100000">
@@ -7892,7 +7821,7 @@
                                     </p:anim>
                                     <p:anim calcmode="lin" valueType="num">
                                       <p:cBhvr additive="base">
-                                        <p:cTn id="13" dur="1000" fill="hold"/>
+                                        <p:cTn id="8" dur="1000" fill="hold"/>
                                         <p:tgtEl>
                                           <p:spTgt spid="3"/>
                                         </p:tgtEl>
@@ -7903,7 +7832,7 @@
                                       <p:tavLst>
                                         <p:tav tm="0">
                                           <p:val>
-                                            <p:strVal val="0-#ppt_h/2"/>
+                                            <p:strVal val="#ppt_y"/>
                                           </p:val>
                                         </p:tav>
                                         <p:tav tm="100000">
@@ -7930,6 +7859,97 @@
                                       </p:to>
                                     </p:animClr>
                                   </p:subTnLst>
+                                </p:cTn>
+                              </p:par>
+                            </p:childTnLst>
+                          </p:cTn>
+                        </p:par>
+                      </p:childTnLst>
+                    </p:cTn>
+                  </p:par>
+                  <p:par>
+                    <p:cTn id="9" fill="hold">
+                      <p:stCondLst>
+                        <p:cond delay="indefinite"/>
+                      </p:stCondLst>
+                      <p:childTnLst>
+                        <p:par>
+                          <p:cTn id="10" fill="hold">
+                            <p:stCondLst>
+                              <p:cond delay="0"/>
+                            </p:stCondLst>
+                            <p:childTnLst>
+                              <p:par>
+                                <p:cTn id="11" presetID="2" presetClass="entr" presetSubtype="2" fill="hold" nodeType="clickEffect">
+                                  <p:stCondLst>
+                                    <p:cond delay="0"/>
+                                  </p:stCondLst>
+                                  <p:childTnLst>
+                                    <p:set>
+                                      <p:cBhvr>
+                                        <p:cTn id="12" dur="1" fill="hold">
+                                          <p:stCondLst>
+                                            <p:cond delay="0"/>
+                                          </p:stCondLst>
+                                        </p:cTn>
+                                        <p:tgtEl>
+                                          <p:spTgt spid="4"/>
+                                        </p:tgtEl>
+                                        <p:attrNameLst>
+                                          <p:attrName>style.visibility</p:attrName>
+                                        </p:attrNameLst>
+                                      </p:cBhvr>
+                                      <p:to>
+                                        <p:strVal val="visible"/>
+                                      </p:to>
+                                    </p:set>
+                                    <p:anim calcmode="lin" valueType="num">
+                                      <p:cBhvr additive="base">
+                                        <p:cTn id="13" dur="1000" fill="hold"/>
+                                        <p:tgtEl>
+                                          <p:spTgt spid="4"/>
+                                        </p:tgtEl>
+                                        <p:attrNameLst>
+                                          <p:attrName>ppt_x</p:attrName>
+                                        </p:attrNameLst>
+                                      </p:cBhvr>
+                                      <p:tavLst>
+                                        <p:tav tm="0">
+                                          <p:val>
+                                            <p:strVal val="1+#ppt_w/2"/>
+                                          </p:val>
+                                        </p:tav>
+                                        <p:tav tm="100000">
+                                          <p:val>
+                                            <p:strVal val="#ppt_x"/>
+                                          </p:val>
+                                        </p:tav>
+                                      </p:tavLst>
+                                    </p:anim>
+                                    <p:anim calcmode="lin" valueType="num">
+                                      <p:cBhvr additive="base">
+                                        <p:cTn id="14" dur="1000" fill="hold"/>
+                                        <p:tgtEl>
+                                          <p:spTgt spid="4"/>
+                                        </p:tgtEl>
+                                        <p:attrNameLst>
+                                          <p:attrName>ppt_y</p:attrName>
+                                        </p:attrNameLst>
+                                      </p:cBhvr>
+                                      <p:tavLst>
+                                        <p:tav tm="0">
+                                          <p:val>
+                                            <p:strVal val="#ppt_y"/>
+                                          </p:val>
+                                        </p:tav>
+                                        <p:tav tm="100000">
+                                          <p:val>
+                                            <p:strVal val="#ppt_y"/>
+                                          </p:val>
+                                        </p:tav>
+                                      </p:tavLst>
+                                    </p:anim>
+                                  </p:childTnLst>
                                 </p:cTn>
                               </p:par>
                             </p:childTnLst>
@@ -9717,16 +9737,16 @@
       </p:sp>
       <p:grpSp>
         <p:nvGrpSpPr>
-          <p:cNvPr id="24" name="Group 23"/>
+          <p:cNvPr id="6" name="Group 5"/>
           <p:cNvGrpSpPr/>
           <p:nvPr/>
         </p:nvGrpSpPr>
         <p:grpSpPr>
           <a:xfrm>
-            <a:off x="3276600" y="5105400"/>
-            <a:ext cx="2971800" cy="990600"/>
-            <a:chOff x="2819400" y="5105400"/>
-            <a:chExt cx="3962400" cy="990600"/>
+            <a:off x="3733800" y="5105400"/>
+            <a:ext cx="2514600" cy="990600"/>
+            <a:chOff x="3733800" y="5105400"/>
+            <a:chExt cx="2514600" cy="990600"/>
           </a:xfrm>
         </p:grpSpPr>
         <p:sp>
@@ -9737,8 +9757,8 @@
           </p:nvSpPr>
           <p:spPr>
             <a:xfrm>
-              <a:off x="2819400" y="5105400"/>
-              <a:ext cx="3962400" cy="990600"/>
+              <a:off x="3733800" y="5105400"/>
+              <a:ext cx="2514600" cy="990600"/>
             </a:xfrm>
             <a:prstGeom prst="roundRect">
               <a:avLst/>
@@ -9780,8 +9800,8 @@
           </p:nvSpPr>
           <p:spPr>
             <a:xfrm>
-              <a:off x="3733800" y="5257800"/>
-              <a:ext cx="2012290" cy="584776"/>
+              <a:off x="3962400" y="5257800"/>
+              <a:ext cx="1509218" cy="584776"/>
             </a:xfrm>
             <a:prstGeom prst="rect">
               <a:avLst/>
@@ -9906,15 +9926,33 @@
                                   </p:childTnLst>
                                 </p:cTn>
                               </p:par>
+                            </p:childTnLst>
+                          </p:cTn>
+                        </p:par>
+                      </p:childTnLst>
+                    </p:cTn>
+                  </p:par>
+                  <p:par>
+                    <p:cTn id="8" fill="hold">
+                      <p:stCondLst>
+                        <p:cond delay="indefinite"/>
+                      </p:stCondLst>
+                      <p:childTnLst>
+                        <p:par>
+                          <p:cTn id="9" fill="hold">
+                            <p:stCondLst>
+                              <p:cond delay="0"/>
+                            </p:stCondLst>
+                            <p:childTnLst>
                               <p:par>
-                                <p:cTn id="8" presetID="9" presetClass="entr" presetSubtype="0" fill="hold" nodeType="withEffect">
+                                <p:cTn id="10" presetID="9" presetClass="entr" presetSubtype="0" fill="hold" nodeType="clickEffect">
                                   <p:stCondLst>
                                     <p:cond delay="0"/>
                                   </p:stCondLst>
                                   <p:childTnLst>
                                     <p:set>
                                       <p:cBhvr>
-                                        <p:cTn id="9" dur="1" fill="hold">
+                                        <p:cTn id="11" dur="1" fill="hold">
                                           <p:stCondLst>
                                             <p:cond delay="0"/>
                                           </p:stCondLst>
@@ -9936,7 +9974,7 @@
                                     </p:set>
                                     <p:animEffect transition="in" filter="dissolve">
                                       <p:cBhvr>
-                                        <p:cTn id="10" dur="500"/>
+                                        <p:cTn id="12" dur="500"/>
                                         <p:tgtEl>
                                           <p:spTgt spid="98308">
                                             <p:txEl>
@@ -9956,26 +9994,26 @@
                     </p:cTn>
                   </p:par>
                   <p:par>
-                    <p:cTn id="11" fill="hold">
+                    <p:cTn id="13" fill="hold">
                       <p:stCondLst>
                         <p:cond delay="indefinite"/>
                       </p:stCondLst>
                       <p:childTnLst>
                         <p:par>
-                          <p:cTn id="12" fill="hold">
+                          <p:cTn id="14" fill="hold">
                             <p:stCondLst>
                               <p:cond delay="0"/>
                             </p:stCondLst>
                             <p:childTnLst>
                               <p:par>
-                                <p:cTn id="13" presetID="10" presetClass="entr" presetSubtype="0" fill="hold" grpId="0" nodeType="clickEffect">
+                                <p:cTn id="15" presetID="10" presetClass="entr" presetSubtype="0" fill="hold" grpId="0" nodeType="clickEffect">
                                   <p:stCondLst>
                                     <p:cond delay="0"/>
                                   </p:stCondLst>
                                   <p:childTnLst>
                                     <p:set>
                                       <p:cBhvr>
-                                        <p:cTn id="14" dur="1" fill="hold">
+                                        <p:cTn id="16" dur="1" fill="hold">
                                           <p:stCondLst>
                                             <p:cond delay="0"/>
                                           </p:stCondLst>
@@ -9997,7 +10035,7 @@
                                     </p:set>
                                     <p:animEffect transition="in" filter="fade">
                                       <p:cBhvr>
-                                        <p:cTn id="15" dur="500"/>
+                                        <p:cTn id="17" dur="500"/>
                                         <p:tgtEl>
                                           <p:spTgt spid="20">
                                             <p:txEl>
@@ -10014,20 +10052,20 @@
                           </p:cTn>
                         </p:par>
                         <p:par>
-                          <p:cTn id="16" fill="hold">
+                          <p:cTn id="18" fill="hold">
                             <p:stCondLst>
                               <p:cond delay="500"/>
                             </p:stCondLst>
                             <p:childTnLst>
                               <p:par>
-                                <p:cTn id="17" presetID="10" presetClass="entr" presetSubtype="0" fill="hold" grpId="0" nodeType="afterEffect">
+                                <p:cTn id="19" presetID="10" presetClass="entr" presetSubtype="0" fill="hold" grpId="0" nodeType="afterEffect">
                                   <p:stCondLst>
                                     <p:cond delay="0"/>
                                   </p:stCondLst>
                                   <p:childTnLst>
                                     <p:set>
                                       <p:cBhvr>
-                                        <p:cTn id="18" dur="1" fill="hold">
+                                        <p:cTn id="20" dur="1" fill="hold">
                                           <p:stCondLst>
                                             <p:cond delay="0"/>
                                           </p:stCondLst>
@@ -10049,7 +10087,7 @@
                                     </p:set>
                                     <p:animEffect transition="in" filter="fade">
                                       <p:cBhvr>
-                                        <p:cTn id="19" dur="500"/>
+                                        <p:cTn id="21" dur="500"/>
                                         <p:tgtEl>
                                           <p:spTgt spid="20">
                                             <p:txEl>
@@ -10069,26 +10107,26 @@
                     </p:cTn>
                   </p:par>
                   <p:par>
-                    <p:cTn id="20" fill="hold">
+                    <p:cTn id="22" fill="hold">
                       <p:stCondLst>
                         <p:cond delay="indefinite"/>
                       </p:stCondLst>
                       <p:childTnLst>
                         <p:par>
-                          <p:cTn id="21" fill="hold">
+                          <p:cTn id="23" fill="hold">
                             <p:stCondLst>
                               <p:cond delay="0"/>
                             </p:stCondLst>
                             <p:childTnLst>
                               <p:par>
-                                <p:cTn id="22" presetID="22" presetClass="entr" presetSubtype="8" fill="hold" nodeType="clickEffect">
+                                <p:cTn id="24" presetID="22" presetClass="entr" presetSubtype="8" fill="hold" nodeType="clickEffect">
                                   <p:stCondLst>
                                     <p:cond delay="0"/>
                                   </p:stCondLst>
                                   <p:childTnLst>
                                     <p:set>
                                       <p:cBhvr>
-                                        <p:cTn id="23" dur="1" fill="hold">
+                                        <p:cTn id="25" dur="1" fill="hold">
                                           <p:stCondLst>
                                             <p:cond delay="0"/>
                                           </p:stCondLst>
@@ -10106,7 +10144,7 @@
                                     </p:set>
                                     <p:animEffect transition="in" filter="wipe(left)">
                                       <p:cBhvr>
-                                        <p:cTn id="24" dur="500"/>
+                                        <p:cTn id="26" dur="500"/>
                                         <p:tgtEl>
                                           <p:spTgt spid="2"/>
                                         </p:tgtEl>
@@ -10119,20 +10157,20 @@
                           </p:cTn>
                         </p:par>
                         <p:par>
-                          <p:cTn id="25" fill="hold">
+                          <p:cTn id="27" fill="hold">
                             <p:stCondLst>
                               <p:cond delay="500"/>
                             </p:stCondLst>
                             <p:childTnLst>
                               <p:par>
-                                <p:cTn id="26" presetID="22" presetClass="entr" presetSubtype="2" fill="hold" nodeType="afterEffect">
+                                <p:cTn id="28" presetID="22" presetClass="entr" presetSubtype="2" fill="hold" nodeType="afterEffect">
                                   <p:stCondLst>
                                     <p:cond delay="0"/>
                                   </p:stCondLst>
                                   <p:childTnLst>
                                     <p:set>
                                       <p:cBhvr>
-                                        <p:cTn id="27" dur="1" fill="hold">
+                                        <p:cTn id="29" dur="1" fill="hold">
                                           <p:stCondLst>
                                             <p:cond delay="0"/>
                                           </p:stCondLst>
@@ -10150,7 +10188,7 @@
                                     </p:set>
                                     <p:animEffect transition="in" filter="wipe(right)">
                                       <p:cBhvr>
-                                        <p:cTn id="28" dur="500"/>
+                                        <p:cTn id="30" dur="500"/>
                                         <p:tgtEl>
                                           <p:spTgt spid="4"/>
                                         </p:tgtEl>
@@ -10162,36 +10200,27 @@
                             </p:childTnLst>
                           </p:cTn>
                         </p:par>
-                      </p:childTnLst>
-                    </p:cTn>
-                  </p:par>
-                  <p:par>
-                    <p:cTn id="29" fill="hold">
-                      <p:stCondLst>
-                        <p:cond delay="indefinite"/>
-                      </p:stCondLst>
-                      <p:childTnLst>
                         <p:par>
-                          <p:cTn id="30" fill="hold">
+                          <p:cTn id="31" fill="hold">
                             <p:stCondLst>
-                              <p:cond delay="0"/>
+                              <p:cond delay="1000"/>
                             </p:stCondLst>
                             <p:childTnLst>
                               <p:par>
-                                <p:cTn id="31" presetID="16" presetClass="entr" presetSubtype="21" fill="hold" nodeType="clickEffect">
+                                <p:cTn id="32" presetID="2" presetClass="entr" presetSubtype="4" fill="hold" nodeType="afterEffect">
                                   <p:stCondLst>
                                     <p:cond delay="0"/>
                                   </p:stCondLst>
                                   <p:childTnLst>
                                     <p:set>
                                       <p:cBhvr>
-                                        <p:cTn id="32" dur="1" fill="hold">
+                                        <p:cTn id="33" dur="1" fill="hold">
                                           <p:stCondLst>
                                             <p:cond delay="0"/>
                                           </p:stCondLst>
                                         </p:cTn>
                                         <p:tgtEl>
-                                          <p:spTgt spid="24"/>
+                                          <p:spTgt spid="6"/>
                                         </p:tgtEl>
                                         <p:attrNameLst>
                                           <p:attrName>style.visibility</p:attrName>
@@ -10201,14 +10230,52 @@
                                         <p:strVal val="visible"/>
                                       </p:to>
                                     </p:set>
-                                    <p:animEffect transition="in" filter="barn(inVertical)">
-                                      <p:cBhvr>
-                                        <p:cTn id="33" dur="1000"/>
+                                    <p:anim calcmode="lin" valueType="num">
+                                      <p:cBhvr additive="base">
+                                        <p:cTn id="34" dur="500" fill="hold"/>
                                         <p:tgtEl>
-                                          <p:spTgt spid="24"/>
+                                          <p:spTgt spid="6"/>
                                         </p:tgtEl>
+                                        <p:attrNameLst>
+                                          <p:attrName>ppt_x</p:attrName>
+                                        </p:attrNameLst>
                                       </p:cBhvr>
-                                    </p:animEffect>
+                                      <p:tavLst>
+                                        <p:tav tm="0">
+                                          <p:val>
+                                            <p:strVal val="#ppt_x"/>
+                                          </p:val>
+                                        </p:tav>
+                                        <p:tav tm="100000">
+                                          <p:val>
+                                            <p:strVal val="#ppt_x"/>
+                                          </p:val>
+                                        </p:tav>
+                                      </p:tavLst>
+                                    </p:anim>
+                                    <p:anim calcmode="lin" valueType="num">
+                                      <p:cBhvr additive="base">
+                                        <p:cTn id="35" dur="500" fill="hold"/>
+                                        <p:tgtEl>
+                                          <p:spTgt spid="6"/>
+                                        </p:tgtEl>
+                                        <p:attrNameLst>
+                                          <p:attrName>ppt_y</p:attrName>
+                                        </p:attrNameLst>
+                                      </p:cBhvr>
+                                      <p:tavLst>
+                                        <p:tav tm="0">
+                                          <p:val>
+                                            <p:strVal val="1+#ppt_h/2"/>
+                                          </p:val>
+                                        </p:tav>
+                                        <p:tav tm="100000">
+                                          <p:val>
+                                            <p:strVal val="#ppt_y"/>
+                                          </p:val>
+                                        </p:tav>
+                                      </p:tavLst>
+                                    </p:anim>
                                   </p:childTnLst>
                                 </p:cTn>
                               </p:par>
@@ -10628,18 +10695,16 @@
       </p:sp>
       <p:grpSp>
         <p:nvGrpSpPr>
-          <p:cNvPr id="9" name="Group 3"/>
-          <p:cNvGrpSpPr>
-            <a:grpSpLocks/>
-          </p:cNvGrpSpPr>
+          <p:cNvPr id="2" name="Group 1"/>
+          <p:cNvGrpSpPr/>
           <p:nvPr/>
         </p:nvGrpSpPr>
-        <p:grpSpPr bwMode="auto">
+        <p:grpSpPr>
           <a:xfrm>
-            <a:off x="990600" y="4495800"/>
-            <a:ext cx="6662738" cy="923925"/>
-            <a:chOff x="624" y="2832"/>
-            <a:chExt cx="4197" cy="582"/>
+            <a:off x="990600" y="4149725"/>
+            <a:ext cx="6662738" cy="1193800"/>
+            <a:chOff x="990600" y="4149725"/>
+            <a:chExt cx="6662738" cy="1193800"/>
           </a:xfrm>
         </p:grpSpPr>
         <p:pic>
@@ -10659,8 +10724,8 @@
           </p:blipFill>
           <p:spPr bwMode="auto">
             <a:xfrm>
-              <a:off x="624" y="2832"/>
-              <a:ext cx="597" cy="534"/>
+              <a:off x="990600" y="4495800"/>
+              <a:ext cx="947738" cy="847725"/>
             </a:xfrm>
             <a:prstGeom prst="rect">
               <a:avLst/>
@@ -10691,8 +10756,8 @@
           </p:blipFill>
           <p:spPr bwMode="auto">
             <a:xfrm>
-              <a:off x="1872" y="2832"/>
-              <a:ext cx="597" cy="534"/>
+              <a:off x="2971800" y="4495800"/>
+              <a:ext cx="947738" cy="847725"/>
             </a:xfrm>
             <a:prstGeom prst="rect">
               <a:avLst/>
@@ -10723,8 +10788,8 @@
           </p:blipFill>
           <p:spPr bwMode="auto">
             <a:xfrm>
-              <a:off x="2448" y="2832"/>
-              <a:ext cx="597" cy="534"/>
+              <a:off x="3886200" y="4495800"/>
+              <a:ext cx="947738" cy="847725"/>
             </a:xfrm>
             <a:prstGeom prst="rect">
               <a:avLst/>
@@ -10755,8 +10820,8 @@
           </p:blipFill>
           <p:spPr bwMode="auto">
             <a:xfrm>
-              <a:off x="3600" y="2832"/>
-              <a:ext cx="597" cy="534"/>
+              <a:off x="5715000" y="4495800"/>
+              <a:ext cx="947738" cy="847725"/>
             </a:xfrm>
             <a:prstGeom prst="rect">
               <a:avLst/>
@@ -10780,8 +10845,8 @@
           </p:nvSpPr>
           <p:spPr bwMode="auto">
             <a:xfrm>
-              <a:off x="3024" y="2832"/>
-              <a:ext cx="553" cy="582"/>
+              <a:off x="4800600" y="4149725"/>
+              <a:ext cx="1030288" cy="1108075"/>
             </a:xfrm>
             <a:prstGeom prst="rect">
               <a:avLst/>
@@ -10801,7 +10866,7 @@
             <a:lstStyle/>
             <a:p>
               <a:r>
-                <a:rPr lang="en-US" sz="5400" dirty="0">
+                <a:rPr lang="en-US" sz="6600" dirty="0">
                   <a:solidFill>
                     <a:srgbClr val="BC34CA"/>
                   </a:solidFill>
@@ -10829,8 +10894,8 @@
           </p:blipFill>
           <p:spPr bwMode="auto">
             <a:xfrm>
-              <a:off x="1248" y="2832"/>
-              <a:ext cx="597" cy="534"/>
+              <a:off x="1981200" y="4495800"/>
+              <a:ext cx="947738" cy="847725"/>
             </a:xfrm>
             <a:prstGeom prst="rect">
               <a:avLst/>
@@ -10861,8 +10926,8 @@
           </p:blipFill>
           <p:spPr bwMode="auto">
             <a:xfrm>
-              <a:off x="4224" y="2832"/>
-              <a:ext cx="597" cy="534"/>
+              <a:off x="6705600" y="4495800"/>
+              <a:ext cx="947738" cy="847725"/>
             </a:xfrm>
             <a:prstGeom prst="rect">
               <a:avLst/>
@@ -10897,7 +10962,83 @@
   <p:timing>
     <p:tnLst>
       <p:par>
-        <p:cTn xmlns:p14="http://schemas.microsoft.com/office/powerpoint/2010/main" id="1" dur="indefinite" restart="never" nodeType="tmRoot"/>
+        <p:cTn xmlns:p14="http://schemas.microsoft.com/office/powerpoint/2010/main" id="1" dur="indefinite" restart="never" nodeType="tmRoot">
+          <p:childTnLst>
+            <p:seq concurrent="1" nextAc="seek">
+              <p:cTn id="2" dur="indefinite" nodeType="mainSeq">
+                <p:childTnLst>
+                  <p:par>
+                    <p:cTn id="3" fill="hold">
+                      <p:stCondLst>
+                        <p:cond delay="indefinite"/>
+                      </p:stCondLst>
+                      <p:childTnLst>
+                        <p:par>
+                          <p:cTn id="4" fill="hold">
+                            <p:stCondLst>
+                              <p:cond delay="0"/>
+                            </p:stCondLst>
+                            <p:childTnLst>
+                              <p:par>
+                                <p:cTn id="5" presetID="22" presetClass="entr" presetSubtype="8" fill="hold" nodeType="clickEffect">
+                                  <p:stCondLst>
+                                    <p:cond delay="0"/>
+                                  </p:stCondLst>
+                                  <p:childTnLst>
+                                    <p:set>
+                                      <p:cBhvr>
+                                        <p:cTn id="6" dur="1" fill="hold">
+                                          <p:stCondLst>
+                                            <p:cond delay="0"/>
+                                          </p:stCondLst>
+                                        </p:cTn>
+                                        <p:tgtEl>
+                                          <p:spTgt spid="2"/>
+                                        </p:tgtEl>
+                                        <p:attrNameLst>
+                                          <p:attrName>style.visibility</p:attrName>
+                                        </p:attrNameLst>
+                                      </p:cBhvr>
+                                      <p:to>
+                                        <p:strVal val="visible"/>
+                                      </p:to>
+                                    </p:set>
+                                    <p:animEffect transition="in" filter="wipe(left)">
+                                      <p:cBhvr>
+                                        <p:cTn id="7" dur="500"/>
+                                        <p:tgtEl>
+                                          <p:spTgt spid="2"/>
+                                        </p:tgtEl>
+                                      </p:cBhvr>
+                                    </p:animEffect>
+                                  </p:childTnLst>
+                                </p:cTn>
+                              </p:par>
+                            </p:childTnLst>
+                          </p:cTn>
+                        </p:par>
+                      </p:childTnLst>
+                    </p:cTn>
+                  </p:par>
+                </p:childTnLst>
+              </p:cTn>
+              <p:prevCondLst>
+                <p:cond evt="onPrev" delay="0">
+                  <p:tgtEl>
+                    <p:sldTgt/>
+                  </p:tgtEl>
+                </p:cond>
+              </p:prevCondLst>
+              <p:nextCondLst>
+                <p:cond evt="onNext" delay="0">
+                  <p:tgtEl>
+                    <p:sldTgt/>
+                  </p:tgtEl>
+                </p:cond>
+              </p:nextCondLst>
+            </p:seq>
+          </p:childTnLst>
+        </p:cTn>
       </p:par>
     </p:tnLst>
   </p:timing>

</xml_diff>

<commit_message>
mq3, induction slides pptx 4 parts
</commit_message>
<xml_diff>
--- a/spring12/slidesS12/bogus-induction.pptx
+++ b/spring12/slidesS12/bogus-induction.pptx
@@ -6678,11 +6678,11 @@
   <p:clrMapOvr>
     <a:masterClrMapping/>
   </p:clrMapOvr>
-  <mc:AlternateContent xmlns:mc="http://schemas.openxmlformats.org/markup-compatibility/2006">
-    <mc:Choice xmlns:p14="http://schemas.microsoft.com/office/powerpoint/2010/main" Requires="p14">
+  <mc:AlternateContent xmlns:mc="http://schemas.openxmlformats.org/markup-compatibility/2006" xmlns:p14="http://schemas.microsoft.com/office/powerpoint/2010/main">
+    <mc:Choice Requires="p14">
       <p:transition spd="slow" p14:dur="2000"/>
     </mc:Choice>
-    <mc:Fallback>
+    <mc:Fallback xmlns="">
       <p:transition xmlns:p14="http://schemas.microsoft.com/office/powerpoint/2010/main" spd="slow"/>
     </mc:Fallback>
   </mc:AlternateContent>

</xml_diff>